<commit_message>
ppt & plan physiques
</commit_message>
<xml_diff>
--- a/Projet_Réseau/Projet 2.pptx
+++ b/Projet_Réseau/Projet 2.pptx
@@ -8,8 +8,9 @@
     <p:sldId id="256" r:id="rId2"/>
     <p:sldId id="257" r:id="rId3"/>
     <p:sldId id="258" r:id="rId4"/>
-    <p:sldId id="260" r:id="rId5"/>
-    <p:sldId id="259" r:id="rId6"/>
+    <p:sldId id="261" r:id="rId5"/>
+    <p:sldId id="260" r:id="rId6"/>
+    <p:sldId id="259" r:id="rId7"/>
   </p:sldIdLst>
   <p:sldSz cx="12192000" cy="6858000"/>
   <p:notesSz cx="6858000" cy="9144000"/>
@@ -267,7 +268,7 @@
           <a:p>
             <a:fld id="{D030C7C0-EEB2-4716-AD63-E01D068BA1F9}" type="datetimeFigureOut">
               <a:rPr lang="fr-FR" smtClean="0"/>
-              <a:t>19/12/2017</a:t>
+              <a:t>20/12/2017</a:t>
             </a:fld>
             <a:endParaRPr lang="fr-FR"/>
           </a:p>
@@ -465,7 +466,7 @@
           <a:p>
             <a:fld id="{D030C7C0-EEB2-4716-AD63-E01D068BA1F9}" type="datetimeFigureOut">
               <a:rPr lang="fr-FR" smtClean="0"/>
-              <a:t>19/12/2017</a:t>
+              <a:t>20/12/2017</a:t>
             </a:fld>
             <a:endParaRPr lang="fr-FR"/>
           </a:p>
@@ -673,7 +674,7 @@
           <a:p>
             <a:fld id="{D030C7C0-EEB2-4716-AD63-E01D068BA1F9}" type="datetimeFigureOut">
               <a:rPr lang="fr-FR" smtClean="0"/>
-              <a:t>19/12/2017</a:t>
+              <a:t>20/12/2017</a:t>
             </a:fld>
             <a:endParaRPr lang="fr-FR"/>
           </a:p>
@@ -871,7 +872,7 @@
           <a:p>
             <a:fld id="{D030C7C0-EEB2-4716-AD63-E01D068BA1F9}" type="datetimeFigureOut">
               <a:rPr lang="fr-FR" smtClean="0"/>
-              <a:t>19/12/2017</a:t>
+              <a:t>20/12/2017</a:t>
             </a:fld>
             <a:endParaRPr lang="fr-FR"/>
           </a:p>
@@ -1146,7 +1147,7 @@
           <a:p>
             <a:fld id="{D030C7C0-EEB2-4716-AD63-E01D068BA1F9}" type="datetimeFigureOut">
               <a:rPr lang="fr-FR" smtClean="0"/>
-              <a:t>19/12/2017</a:t>
+              <a:t>20/12/2017</a:t>
             </a:fld>
             <a:endParaRPr lang="fr-FR"/>
           </a:p>
@@ -1411,7 +1412,7 @@
           <a:p>
             <a:fld id="{D030C7C0-EEB2-4716-AD63-E01D068BA1F9}" type="datetimeFigureOut">
               <a:rPr lang="fr-FR" smtClean="0"/>
-              <a:t>19/12/2017</a:t>
+              <a:t>20/12/2017</a:t>
             </a:fld>
             <a:endParaRPr lang="fr-FR"/>
           </a:p>
@@ -1823,7 +1824,7 @@
           <a:p>
             <a:fld id="{D030C7C0-EEB2-4716-AD63-E01D068BA1F9}" type="datetimeFigureOut">
               <a:rPr lang="fr-FR" smtClean="0"/>
-              <a:t>19/12/2017</a:t>
+              <a:t>20/12/2017</a:t>
             </a:fld>
             <a:endParaRPr lang="fr-FR"/>
           </a:p>
@@ -1964,7 +1965,7 @@
           <a:p>
             <a:fld id="{D030C7C0-EEB2-4716-AD63-E01D068BA1F9}" type="datetimeFigureOut">
               <a:rPr lang="fr-FR" smtClean="0"/>
-              <a:t>19/12/2017</a:t>
+              <a:t>20/12/2017</a:t>
             </a:fld>
             <a:endParaRPr lang="fr-FR"/>
           </a:p>
@@ -2077,7 +2078,7 @@
           <a:p>
             <a:fld id="{D030C7C0-EEB2-4716-AD63-E01D068BA1F9}" type="datetimeFigureOut">
               <a:rPr lang="fr-FR" smtClean="0"/>
-              <a:t>19/12/2017</a:t>
+              <a:t>20/12/2017</a:t>
             </a:fld>
             <a:endParaRPr lang="fr-FR"/>
           </a:p>
@@ -2388,7 +2389,7 @@
           <a:p>
             <a:fld id="{D030C7C0-EEB2-4716-AD63-E01D068BA1F9}" type="datetimeFigureOut">
               <a:rPr lang="fr-FR" smtClean="0"/>
-              <a:t>19/12/2017</a:t>
+              <a:t>20/12/2017</a:t>
             </a:fld>
             <a:endParaRPr lang="fr-FR"/>
           </a:p>
@@ -2676,7 +2677,7 @@
           <a:p>
             <a:fld id="{D030C7C0-EEB2-4716-AD63-E01D068BA1F9}" type="datetimeFigureOut">
               <a:rPr lang="fr-FR" smtClean="0"/>
-              <a:t>19/12/2017</a:t>
+              <a:t>20/12/2017</a:t>
             </a:fld>
             <a:endParaRPr lang="fr-FR"/>
           </a:p>
@@ -2917,7 +2918,7 @@
           <a:p>
             <a:fld id="{D030C7C0-EEB2-4716-AD63-E01D068BA1F9}" type="datetimeFigureOut">
               <a:rPr lang="fr-FR" smtClean="0"/>
-              <a:t>19/12/2017</a:t>
+              <a:t>20/12/2017</a:t>
             </a:fld>
             <a:endParaRPr lang="fr-FR"/>
           </a:p>
@@ -4257,6 +4258,12 @@
           <a:p>
             <a:r>
               <a:rPr lang="fr-FR" sz="1800" dirty="0"/>
+              <a:t>1 D-Link DES-108 (Switch 8 ports)</a:t>
+            </a:r>
+          </a:p>
+          <a:p>
+            <a:r>
+              <a:rPr lang="fr-FR" sz="1800" dirty="0"/>
               <a:t>2 « D-Link DAP-2360 Point d'accès sans fil PoE »(PA Wi-Fi)</a:t>
             </a:r>
           </a:p>
@@ -4305,6 +4312,96 @@
 </file>
 
 <file path=ppt/slides/slide4.xml><?xml version="1.0" encoding="utf-8"?>
+<p:sld xmlns:a="http://schemas.openxmlformats.org/drawingml/2006/main" xmlns:r="http://schemas.openxmlformats.org/officeDocument/2006/relationships" xmlns:p="http://schemas.openxmlformats.org/presentationml/2006/main">
+  <p:cSld>
+    <p:spTree>
+      <p:nvGrpSpPr>
+        <p:cNvPr id="1" name=""/>
+        <p:cNvGrpSpPr/>
+        <p:nvPr/>
+      </p:nvGrpSpPr>
+      <p:grpSpPr>
+        <a:xfrm>
+          <a:off x="0" y="0"/>
+          <a:ext cx="0" cy="0"/>
+          <a:chOff x="0" y="0"/>
+          <a:chExt cx="0" cy="0"/>
+        </a:xfrm>
+      </p:grpSpPr>
+      <p:sp>
+        <p:nvSpPr>
+          <p:cNvPr id="2" name="Titre 1">
+            <a:extLst>
+              <a:ext uri="{FF2B5EF4-FFF2-40B4-BE49-F238E27FC236}">
+                <a16:creationId xmlns:a16="http://schemas.microsoft.com/office/drawing/2014/main" id="{56E9802A-B5AD-4FA2-A6FF-7810D2566C39}"/>
+              </a:ext>
+            </a:extLst>
+          </p:cNvPr>
+          <p:cNvSpPr>
+            <a:spLocks noGrp="1"/>
+          </p:cNvSpPr>
+          <p:nvPr>
+            <p:ph type="title"/>
+          </p:nvPr>
+        </p:nvSpPr>
+        <p:spPr/>
+        <p:txBody>
+          <a:bodyPr/>
+          <a:lstStyle/>
+          <a:p>
+            <a:r>
+              <a:rPr lang="fr-FR" dirty="0"/>
+              <a:t>Matériel Classique</a:t>
+            </a:r>
+          </a:p>
+        </p:txBody>
+      </p:sp>
+      <p:sp>
+        <p:nvSpPr>
+          <p:cNvPr id="3" name="Espace réservé du contenu 2">
+            <a:extLst>
+              <a:ext uri="{FF2B5EF4-FFF2-40B4-BE49-F238E27FC236}">
+                <a16:creationId xmlns:a16="http://schemas.microsoft.com/office/drawing/2014/main" id="{559414E4-B11F-459F-AC65-1A76AE222873}"/>
+              </a:ext>
+            </a:extLst>
+          </p:cNvPr>
+          <p:cNvSpPr>
+            <a:spLocks noGrp="1"/>
+          </p:cNvSpPr>
+          <p:nvPr>
+            <p:ph idx="1"/>
+          </p:nvPr>
+        </p:nvSpPr>
+        <p:spPr/>
+        <p:txBody>
+          <a:bodyPr/>
+          <a:lstStyle/>
+          <a:p>
+            <a:r>
+              <a:rPr lang="fr-FR" dirty="0"/>
+              <a:t>Tables </a:t>
+            </a:r>
+            <a:r>
+              <a:rPr lang="fr-FR"/>
+              <a:t>et chaises</a:t>
+            </a:r>
+          </a:p>
+        </p:txBody>
+      </p:sp>
+    </p:spTree>
+    <p:extLst>
+      <p:ext uri="{BB962C8B-B14F-4D97-AF65-F5344CB8AC3E}">
+        <p14:creationId xmlns:p14="http://schemas.microsoft.com/office/powerpoint/2010/main" val="2690955881"/>
+      </p:ext>
+    </p:extLst>
+  </p:cSld>
+  <p:clrMapOvr>
+    <a:masterClrMapping/>
+  </p:clrMapOvr>
+</p:sld>
+</file>
+
+<file path=ppt/slides/slide5.xml><?xml version="1.0" encoding="utf-8"?>
 <p:sld xmlns:a="http://schemas.openxmlformats.org/drawingml/2006/main" xmlns:r="http://schemas.openxmlformats.org/officeDocument/2006/relationships" xmlns:p="http://schemas.openxmlformats.org/presentationml/2006/main">
   <p:cSld>
     <p:spTree>
@@ -4514,7 +4611,7 @@
 </p:sld>
 </file>
 
-<file path=ppt/slides/slide5.xml><?xml version="1.0" encoding="utf-8"?>
+<file path=ppt/slides/slide6.xml><?xml version="1.0" encoding="utf-8"?>
 <p:sld xmlns:a="http://schemas.openxmlformats.org/drawingml/2006/main" xmlns:r="http://schemas.openxmlformats.org/officeDocument/2006/relationships" xmlns:p="http://schemas.openxmlformats.org/presentationml/2006/main">
   <p:cSld>
     <p:spTree>
@@ -4581,6 +4678,12 @@
         <p:txBody>
           <a:bodyPr/>
           <a:lstStyle/>
+          <a:p>
+            <a:r>
+              <a:rPr lang="fr-FR" dirty="0"/>
+              <a:t>Switch 8 ports : 19,90 €</a:t>
+            </a:r>
+          </a:p>
           <a:p>
             <a:r>
               <a:rPr lang="fr-FR" dirty="0"/>

</xml_diff>

<commit_message>
Continuation des aménagements matériels
</commit_message>
<xml_diff>
--- a/Projet_Réseau/Projet 2.pptx
+++ b/Projet_Réseau/Projet 2.pptx
@@ -10,9 +10,8 @@
     <p:sldId id="258" r:id="rId4"/>
     <p:sldId id="262" r:id="rId5"/>
     <p:sldId id="261" r:id="rId6"/>
-    <p:sldId id="260" r:id="rId7"/>
-    <p:sldId id="259" r:id="rId8"/>
-    <p:sldId id="263" r:id="rId9"/>
+    <p:sldId id="259" r:id="rId7"/>
+    <p:sldId id="263" r:id="rId8"/>
   </p:sldIdLst>
   <p:sldSz cx="12192000" cy="6858000"/>
   <p:notesSz cx="6858000" cy="9144000"/>
@@ -3471,7 +3470,7 @@
             <p:ph idx="1"/>
             <p:extLst>
               <p:ext uri="{D42A27DB-BD31-4B8C-83A1-F6EECF244321}">
-                <p14:modId xmlns:p14="http://schemas.microsoft.com/office/powerpoint/2010/main" val="1241962945"/>
+                <p14:modId xmlns:p14="http://schemas.microsoft.com/office/powerpoint/2010/main" val="2477457643"/>
               </p:ext>
             </p:extLst>
           </p:nvPr>
@@ -3836,7 +3835,7 @@
                           <a:ea typeface="+mn-ea"/>
                           <a:cs typeface="+mn-cs"/>
                         </a:rPr>
-                        <a:t>Si le Hub lâche, tout lâche et il est cher</a:t>
+                        <a:t>Si le Switch lâche, tout lâche et il est cher</a:t>
                       </a:r>
                     </a:p>
                   </a:txBody>
@@ -4406,13 +4405,8 @@
           <a:p>
             <a:r>
               <a:rPr lang="fr-FR" dirty="0"/>
-              <a:t>Câble </a:t>
-            </a:r>
-            <a:r>
-              <a:rPr lang="fr-FR"/>
-              <a:t>HDMI 50 m </a:t>
-            </a:r>
-            <a:endParaRPr lang="fr-FR" dirty="0"/>
+              <a:t>Câble HDMI PRO 1.4v 50 m</a:t>
+            </a:r>
           </a:p>
         </p:txBody>
       </p:sp>
@@ -4532,6 +4526,16 @@
             </a:r>
           </a:p>
           <a:p>
+            <a:r>
+              <a:rPr lang="fr-FR" dirty="0"/>
+              <a:t>3x(10 x 2,5m) Barrières Vauban </a:t>
+            </a:r>
+            <a:r>
+              <a:rPr lang="fr-FR"/>
+              <a:t>(location W-E : 96 €)</a:t>
+            </a:r>
+          </a:p>
+          <a:p>
             <a:endParaRPr lang="fr-FR" dirty="0"/>
           </a:p>
         </p:txBody>
@@ -4571,7 +4575,7 @@
           <p:cNvPr id="2" name="Titre 1">
             <a:extLst>
               <a:ext uri="{FF2B5EF4-FFF2-40B4-BE49-F238E27FC236}">
-                <a16:creationId xmlns:a16="http://schemas.microsoft.com/office/drawing/2014/main" id="{1311FFFF-D306-4247-898F-A547B6E02CB1}"/>
+                <a16:creationId xmlns:a16="http://schemas.microsoft.com/office/drawing/2014/main" id="{EBCD369D-0FA7-4AED-B518-D5623DC1288F}"/>
               </a:ext>
             </a:extLst>
           </p:cNvPr>
@@ -4589,167 +4593,120 @@
           <a:p>
             <a:pPr algn="ctr"/>
             <a:r>
+              <a:rPr lang="fr-FR"/>
+              <a:t>Budget interconnexions</a:t>
+            </a:r>
+            <a:endParaRPr lang="fr-FR" dirty="0"/>
+          </a:p>
+        </p:txBody>
+      </p:sp>
+      <p:sp>
+        <p:nvSpPr>
+          <p:cNvPr id="3" name="Espace réservé du contenu 2">
+            <a:extLst>
+              <a:ext uri="{FF2B5EF4-FFF2-40B4-BE49-F238E27FC236}">
+                <a16:creationId xmlns:a16="http://schemas.microsoft.com/office/drawing/2014/main" id="{F7B9386E-351C-444C-BD8A-9D9FAC7BF9A2}"/>
+              </a:ext>
+            </a:extLst>
+          </p:cNvPr>
+          <p:cNvSpPr>
+            <a:spLocks noGrp="1"/>
+          </p:cNvSpPr>
+          <p:nvPr>
+            <p:ph idx="1"/>
+          </p:nvPr>
+        </p:nvSpPr>
+        <p:spPr/>
+        <p:txBody>
+          <a:bodyPr numCol="2"/>
+          <a:lstStyle/>
+          <a:p>
+            <a:r>
               <a:rPr lang="fr-FR" dirty="0"/>
-              <a:t>Visualisation du matériel</a:t>
-            </a:r>
-          </a:p>
-        </p:txBody>
-      </p:sp>
-      <p:pic>
-        <p:nvPicPr>
-          <p:cNvPr id="4" name="Espace réservé du contenu 3">
-            <a:extLst>
-              <a:ext uri="{FF2B5EF4-FFF2-40B4-BE49-F238E27FC236}">
-                <a16:creationId xmlns:a16="http://schemas.microsoft.com/office/drawing/2014/main" id="{E3A836DC-20D9-4E24-9AA8-8CAAEA4D0D40}"/>
-              </a:ext>
-            </a:extLst>
-          </p:cNvPr>
-          <p:cNvPicPr>
-            <a:picLocks noGrp="1" noChangeAspect="1"/>
-          </p:cNvPicPr>
-          <p:nvPr>
-            <p:ph idx="1"/>
-          </p:nvPr>
-        </p:nvPicPr>
-        <p:blipFill>
-          <a:blip r:embed="rId2"/>
-          <a:stretch>
-            <a:fillRect/>
-          </a:stretch>
-        </p:blipFill>
-        <p:spPr>
-          <a:xfrm>
-            <a:off x="7622287" y="2483201"/>
-            <a:ext cx="2071688" cy="2071688"/>
-          </a:xfrm>
-          <a:prstGeom prst="rect">
-            <a:avLst/>
-          </a:prstGeom>
-        </p:spPr>
-      </p:pic>
-      <p:pic>
-        <p:nvPicPr>
-          <p:cNvPr id="5" name="Image 4">
-            <a:extLst>
-              <a:ext uri="{FF2B5EF4-FFF2-40B4-BE49-F238E27FC236}">
-                <a16:creationId xmlns:a16="http://schemas.microsoft.com/office/drawing/2014/main" id="{A2CEF1AE-0BBD-46F9-B86C-C10D10AE4636}"/>
-              </a:ext>
-            </a:extLst>
-          </p:cNvPr>
-          <p:cNvPicPr>
-            <a:picLocks noChangeAspect="1"/>
-          </p:cNvPicPr>
-          <p:nvPr/>
-        </p:nvPicPr>
-        <p:blipFill rotWithShape="1">
-          <a:blip r:embed="rId3"/>
-          <a:srcRect l="33206" r="32064"/>
-          <a:stretch/>
-        </p:blipFill>
-        <p:spPr>
-          <a:xfrm>
-            <a:off x="9915983" y="2660754"/>
-            <a:ext cx="1235242" cy="1977582"/>
-          </a:xfrm>
-          <a:prstGeom prst="rect">
-            <a:avLst/>
-          </a:prstGeom>
-        </p:spPr>
-      </p:pic>
-      <p:pic>
-        <p:nvPicPr>
-          <p:cNvPr id="3" name="Image 2">
-            <a:extLst>
-              <a:ext uri="{FF2B5EF4-FFF2-40B4-BE49-F238E27FC236}">
-                <a16:creationId xmlns:a16="http://schemas.microsoft.com/office/drawing/2014/main" id="{3C51C76F-D36A-4FBB-8E4A-CEA52CA72BC6}"/>
-              </a:ext>
-            </a:extLst>
-          </p:cNvPr>
-          <p:cNvPicPr>
-            <a:picLocks noChangeAspect="1"/>
-          </p:cNvPicPr>
-          <p:nvPr/>
-        </p:nvPicPr>
-        <p:blipFill>
-          <a:blip r:embed="rId4"/>
-          <a:stretch>
-            <a:fillRect/>
-          </a:stretch>
-        </p:blipFill>
-        <p:spPr>
-          <a:xfrm>
-            <a:off x="1431255" y="3734554"/>
-            <a:ext cx="2810305" cy="1873537"/>
-          </a:xfrm>
-          <a:prstGeom prst="rect">
-            <a:avLst/>
-          </a:prstGeom>
-        </p:spPr>
-      </p:pic>
-      <p:pic>
-        <p:nvPicPr>
-          <p:cNvPr id="6" name="Image 5">
-            <a:extLst>
-              <a:ext uri="{FF2B5EF4-FFF2-40B4-BE49-F238E27FC236}">
-                <a16:creationId xmlns:a16="http://schemas.microsoft.com/office/drawing/2014/main" id="{67FC0AF8-DA61-4334-B064-BCF9B3A149F3}"/>
-              </a:ext>
-            </a:extLst>
-          </p:cNvPr>
-          <p:cNvPicPr>
-            <a:picLocks noChangeAspect="1"/>
-          </p:cNvPicPr>
-          <p:nvPr/>
-        </p:nvPicPr>
-        <p:blipFill>
-          <a:blip r:embed="rId5"/>
-          <a:stretch>
-            <a:fillRect/>
-          </a:stretch>
-        </p:blipFill>
-        <p:spPr>
-          <a:xfrm>
-            <a:off x="4779727" y="3667339"/>
-            <a:ext cx="2366798" cy="1775099"/>
-          </a:xfrm>
-          <a:prstGeom prst="rect">
-            <a:avLst/>
-          </a:prstGeom>
-        </p:spPr>
-      </p:pic>
-      <p:pic>
-        <p:nvPicPr>
-          <p:cNvPr id="7" name="Image 6">
-            <a:extLst>
-              <a:ext uri="{FF2B5EF4-FFF2-40B4-BE49-F238E27FC236}">
-                <a16:creationId xmlns:a16="http://schemas.microsoft.com/office/drawing/2014/main" id="{854FEB2F-E064-49BA-866F-62F23B6FD676}"/>
-              </a:ext>
-            </a:extLst>
-          </p:cNvPr>
-          <p:cNvPicPr>
-            <a:picLocks noChangeAspect="1"/>
-          </p:cNvPicPr>
-          <p:nvPr/>
-        </p:nvPicPr>
-        <p:blipFill>
-          <a:blip r:embed="rId6"/>
-          <a:stretch>
-            <a:fillRect/>
-          </a:stretch>
-        </p:blipFill>
-        <p:spPr>
-          <a:xfrm>
-            <a:off x="2835891" y="2006633"/>
-            <a:ext cx="2810307" cy="1873537"/>
-          </a:xfrm>
-          <a:prstGeom prst="rect">
-            <a:avLst/>
-          </a:prstGeom>
-        </p:spPr>
-      </p:pic>
+              <a:t>Switch 8 ports : 19,90 €</a:t>
+            </a:r>
+          </a:p>
+          <a:p>
+            <a:r>
+              <a:rPr lang="fr-FR" dirty="0"/>
+              <a:t>Switch 16 ports : 29,99 €</a:t>
+            </a:r>
+          </a:p>
+          <a:p>
+            <a:r>
+              <a:rPr lang="fr-FR" dirty="0"/>
+              <a:t>Switch 24 ports : 1047,75 €</a:t>
+            </a:r>
+          </a:p>
+          <a:p>
+            <a:r>
+              <a:rPr lang="fr-FR" dirty="0"/>
+              <a:t>Switch 48 ports : 182,26 €</a:t>
+            </a:r>
+          </a:p>
+          <a:p>
+            <a:r>
+              <a:rPr lang="fr-FR" dirty="0"/>
+              <a:t>Point d’accès Wi-Fi : 265,90 €</a:t>
+            </a:r>
+          </a:p>
+          <a:p>
+            <a:r>
+              <a:rPr lang="fr-FR" dirty="0"/>
+              <a:t>Répéteur Wi-Fi : 34,99 €</a:t>
+            </a:r>
+          </a:p>
+          <a:p>
+            <a:r>
+              <a:rPr lang="fr-FR" dirty="0"/>
+              <a:t>Serveur CS : GO : 929,95 €</a:t>
+            </a:r>
+          </a:p>
+          <a:p>
+            <a:endParaRPr lang="fr-FR" dirty="0"/>
+          </a:p>
+          <a:p>
+            <a:r>
+              <a:rPr lang="fr-FR" dirty="0"/>
+              <a:t>Câbles RJ45 5m : 942,82 €</a:t>
+            </a:r>
+          </a:p>
+          <a:p>
+            <a:r>
+              <a:rPr lang="fr-FR" dirty="0"/>
+              <a:t>Câbles RJ45 10m : 2865,60 €</a:t>
+            </a:r>
+          </a:p>
+          <a:p>
+            <a:r>
+              <a:rPr lang="fr-FR" dirty="0"/>
+              <a:t>Câbles RJ45 15 m : 1064,29 €</a:t>
+            </a:r>
+          </a:p>
+          <a:p>
+            <a:r>
+              <a:rPr lang="fr-FR" dirty="0"/>
+              <a:t>Câbles RJ45 20 m : 74,85 €</a:t>
+            </a:r>
+          </a:p>
+          <a:p>
+            <a:r>
+              <a:rPr lang="fr-FR" dirty="0"/>
+              <a:t>Câbles RJ45 30 m : 159,80 €</a:t>
+            </a:r>
+          </a:p>
+          <a:p>
+            <a:r>
+              <a:rPr lang="fr-FR" dirty="0"/>
+              <a:t>Câble HDMI 50m : 320 €</a:t>
+            </a:r>
+          </a:p>
+        </p:txBody>
+      </p:sp>
     </p:spTree>
     <p:extLst>
       <p:ext uri="{BB962C8B-B14F-4D97-AF65-F5344CB8AC3E}">
-        <p14:creationId xmlns:p14="http://schemas.microsoft.com/office/powerpoint/2010/main" val="2134158528"/>
+        <p14:creationId xmlns:p14="http://schemas.microsoft.com/office/powerpoint/2010/main" val="250398951"/>
       </p:ext>
     </p:extLst>
   </p:cSld>
@@ -4781,7 +4738,7 @@
           <p:cNvPr id="2" name="Titre 1">
             <a:extLst>
               <a:ext uri="{FF2B5EF4-FFF2-40B4-BE49-F238E27FC236}">
-                <a16:creationId xmlns:a16="http://schemas.microsoft.com/office/drawing/2014/main" id="{EBCD369D-0FA7-4AED-B518-D5623DC1288F}"/>
+                <a16:creationId xmlns:a16="http://schemas.microsoft.com/office/drawing/2014/main" id="{55C2B660-433A-4C3F-A325-7D33CC77C669}"/>
               </a:ext>
             </a:extLst>
           </p:cNvPr>
@@ -4799,10 +4756,9 @@
           <a:p>
             <a:pPr algn="ctr"/>
             <a:r>
-              <a:rPr lang="fr-FR"/>
-              <a:t>Budget interconnexions</a:t>
-            </a:r>
-            <a:endParaRPr lang="fr-FR" dirty="0"/>
+              <a:rPr lang="fr-FR" dirty="0"/>
+              <a:t>Sponsors</a:t>
+            </a:r>
           </a:p>
         </p:txBody>
       </p:sp>
@@ -4811,7 +4767,7 @@
           <p:cNvPr id="3" name="Espace réservé du contenu 2">
             <a:extLst>
               <a:ext uri="{FF2B5EF4-FFF2-40B4-BE49-F238E27FC236}">
-                <a16:creationId xmlns:a16="http://schemas.microsoft.com/office/drawing/2014/main" id="{F7B9386E-351C-444C-BD8A-9D9FAC7BF9A2}"/>
+                <a16:creationId xmlns:a16="http://schemas.microsoft.com/office/drawing/2014/main" id="{FB4C10E6-B2E1-48A4-A1BB-557FBE82C710}"/>
               </a:ext>
             </a:extLst>
           </p:cNvPr>
@@ -4825,162 +4781,6 @@
         <p:spPr/>
         <p:txBody>
           <a:bodyPr numCol="2"/>
-          <a:lstStyle/>
-          <a:p>
-            <a:r>
-              <a:rPr lang="fr-FR" dirty="0"/>
-              <a:t>Switch 8 ports : 19,90 €</a:t>
-            </a:r>
-          </a:p>
-          <a:p>
-            <a:r>
-              <a:rPr lang="fr-FR" dirty="0"/>
-              <a:t>Switch 16 ports : 29,99 €</a:t>
-            </a:r>
-          </a:p>
-          <a:p>
-            <a:r>
-              <a:rPr lang="fr-FR" dirty="0"/>
-              <a:t>Switch 24 ports : 1047,75 €</a:t>
-            </a:r>
-          </a:p>
-          <a:p>
-            <a:r>
-              <a:rPr lang="fr-FR" dirty="0"/>
-              <a:t>Switch 48 ports : 182,26 €</a:t>
-            </a:r>
-          </a:p>
-          <a:p>
-            <a:r>
-              <a:rPr lang="fr-FR" dirty="0"/>
-              <a:t>Point d’accès Wi-Fi : 265,90 €</a:t>
-            </a:r>
-          </a:p>
-          <a:p>
-            <a:r>
-              <a:rPr lang="fr-FR" dirty="0"/>
-              <a:t>Répéteur Wi-Fi : 34,99 €</a:t>
-            </a:r>
-          </a:p>
-          <a:p>
-            <a:r>
-              <a:rPr lang="fr-FR" dirty="0"/>
-              <a:t>Serveur CS : GO : 929,95 €</a:t>
-            </a:r>
-          </a:p>
-          <a:p>
-            <a:endParaRPr lang="fr-FR" dirty="0"/>
-          </a:p>
-          <a:p>
-            <a:r>
-              <a:rPr lang="fr-FR" dirty="0"/>
-              <a:t>Câbles RJ45 5m : 942,82 €</a:t>
-            </a:r>
-          </a:p>
-          <a:p>
-            <a:r>
-              <a:rPr lang="fr-FR" dirty="0"/>
-              <a:t>Câbles RJ45 10m : 2865,60 €</a:t>
-            </a:r>
-          </a:p>
-          <a:p>
-            <a:r>
-              <a:rPr lang="fr-FR" dirty="0"/>
-              <a:t>Câbles RJ45 15 m : 1064,29 €</a:t>
-            </a:r>
-          </a:p>
-          <a:p>
-            <a:r>
-              <a:rPr lang="fr-FR" dirty="0"/>
-              <a:t>Câbles RJ45 20 m : 74,85 €</a:t>
-            </a:r>
-          </a:p>
-          <a:p>
-            <a:r>
-              <a:rPr lang="fr-FR" dirty="0"/>
-              <a:t>Câbles RJ45 30 m : 159,80 €</a:t>
-            </a:r>
-          </a:p>
-        </p:txBody>
-      </p:sp>
-    </p:spTree>
-    <p:extLst>
-      <p:ext uri="{BB962C8B-B14F-4D97-AF65-F5344CB8AC3E}">
-        <p14:creationId xmlns:p14="http://schemas.microsoft.com/office/powerpoint/2010/main" val="250398951"/>
-      </p:ext>
-    </p:extLst>
-  </p:cSld>
-  <p:clrMapOvr>
-    <a:masterClrMapping/>
-  </p:clrMapOvr>
-</p:sld>
-</file>
-
-<file path=ppt/slides/slide8.xml><?xml version="1.0" encoding="utf-8"?>
-<p:sld xmlns:a="http://schemas.openxmlformats.org/drawingml/2006/main" xmlns:r="http://schemas.openxmlformats.org/officeDocument/2006/relationships" xmlns:p="http://schemas.openxmlformats.org/presentationml/2006/main">
-  <p:cSld>
-    <p:spTree>
-      <p:nvGrpSpPr>
-        <p:cNvPr id="1" name=""/>
-        <p:cNvGrpSpPr/>
-        <p:nvPr/>
-      </p:nvGrpSpPr>
-      <p:grpSpPr>
-        <a:xfrm>
-          <a:off x="0" y="0"/>
-          <a:ext cx="0" cy="0"/>
-          <a:chOff x="0" y="0"/>
-          <a:chExt cx="0" cy="0"/>
-        </a:xfrm>
-      </p:grpSpPr>
-      <p:sp>
-        <p:nvSpPr>
-          <p:cNvPr id="2" name="Titre 1">
-            <a:extLst>
-              <a:ext uri="{FF2B5EF4-FFF2-40B4-BE49-F238E27FC236}">
-                <a16:creationId xmlns:a16="http://schemas.microsoft.com/office/drawing/2014/main" id="{55C2B660-433A-4C3F-A325-7D33CC77C669}"/>
-              </a:ext>
-            </a:extLst>
-          </p:cNvPr>
-          <p:cNvSpPr>
-            <a:spLocks noGrp="1"/>
-          </p:cNvSpPr>
-          <p:nvPr>
-            <p:ph type="title"/>
-          </p:nvPr>
-        </p:nvSpPr>
-        <p:spPr/>
-        <p:txBody>
-          <a:bodyPr/>
-          <a:lstStyle/>
-          <a:p>
-            <a:pPr algn="ctr"/>
-            <a:r>
-              <a:rPr lang="fr-FR" dirty="0"/>
-              <a:t>Financements</a:t>
-            </a:r>
-          </a:p>
-        </p:txBody>
-      </p:sp>
-      <p:sp>
-        <p:nvSpPr>
-          <p:cNvPr id="3" name="Espace réservé du contenu 2">
-            <a:extLst>
-              <a:ext uri="{FF2B5EF4-FFF2-40B4-BE49-F238E27FC236}">
-                <a16:creationId xmlns:a16="http://schemas.microsoft.com/office/drawing/2014/main" id="{FB4C10E6-B2E1-48A4-A1BB-557FBE82C710}"/>
-              </a:ext>
-            </a:extLst>
-          </p:cNvPr>
-          <p:cNvSpPr>
-            <a:spLocks noGrp="1"/>
-          </p:cNvSpPr>
-          <p:nvPr>
-            <p:ph idx="1"/>
-          </p:nvPr>
-        </p:nvSpPr>
-        <p:spPr/>
-        <p:txBody>
-          <a:bodyPr/>
           <a:lstStyle/>
           <a:p>
             <a:r>
@@ -5001,6 +4801,24 @@
               <a:rPr lang="fr-FR" dirty="0"/>
               <a:t>Support BDE : 1000 €</a:t>
             </a:r>
+          </a:p>
+          <a:p>
+            <a:endParaRPr lang="fr-FR" dirty="0"/>
+          </a:p>
+          <a:p>
+            <a:endParaRPr lang="fr-FR" dirty="0"/>
+          </a:p>
+          <a:p>
+            <a:endParaRPr lang="fr-FR" dirty="0"/>
+          </a:p>
+          <a:p>
+            <a:endParaRPr lang="fr-FR" dirty="0"/>
+          </a:p>
+          <a:p>
+            <a:endParaRPr lang="fr-FR" dirty="0"/>
+          </a:p>
+          <a:p>
+            <a:endParaRPr lang="fr-FR" dirty="0"/>
           </a:p>
           <a:p>
             <a:endParaRPr lang="fr-FR" dirty="0"/>

</xml_diff>

<commit_message>
le ppt est juste un doc info
</commit_message>
<xml_diff>
--- a/Projet_Réseau/Projet 2.pptx
+++ b/Projet_Réseau/Projet 2.pptx
@@ -269,7 +269,7 @@
           <a:p>
             <a:fld id="{D030C7C0-EEB2-4716-AD63-E01D068BA1F9}" type="datetimeFigureOut">
               <a:rPr lang="fr-FR" smtClean="0"/>
-              <a:t>20/12/2017</a:t>
+              <a:t>21/12/2017</a:t>
             </a:fld>
             <a:endParaRPr lang="fr-FR"/>
           </a:p>
@@ -467,7 +467,7 @@
           <a:p>
             <a:fld id="{D030C7C0-EEB2-4716-AD63-E01D068BA1F9}" type="datetimeFigureOut">
               <a:rPr lang="fr-FR" smtClean="0"/>
-              <a:t>20/12/2017</a:t>
+              <a:t>21/12/2017</a:t>
             </a:fld>
             <a:endParaRPr lang="fr-FR"/>
           </a:p>
@@ -675,7 +675,7 @@
           <a:p>
             <a:fld id="{D030C7C0-EEB2-4716-AD63-E01D068BA1F9}" type="datetimeFigureOut">
               <a:rPr lang="fr-FR" smtClean="0"/>
-              <a:t>20/12/2017</a:t>
+              <a:t>21/12/2017</a:t>
             </a:fld>
             <a:endParaRPr lang="fr-FR"/>
           </a:p>
@@ -873,7 +873,7 @@
           <a:p>
             <a:fld id="{D030C7C0-EEB2-4716-AD63-E01D068BA1F9}" type="datetimeFigureOut">
               <a:rPr lang="fr-FR" smtClean="0"/>
-              <a:t>20/12/2017</a:t>
+              <a:t>21/12/2017</a:t>
             </a:fld>
             <a:endParaRPr lang="fr-FR"/>
           </a:p>
@@ -1148,7 +1148,7 @@
           <a:p>
             <a:fld id="{D030C7C0-EEB2-4716-AD63-E01D068BA1F9}" type="datetimeFigureOut">
               <a:rPr lang="fr-FR" smtClean="0"/>
-              <a:t>20/12/2017</a:t>
+              <a:t>21/12/2017</a:t>
             </a:fld>
             <a:endParaRPr lang="fr-FR"/>
           </a:p>
@@ -1413,7 +1413,7 @@
           <a:p>
             <a:fld id="{D030C7C0-EEB2-4716-AD63-E01D068BA1F9}" type="datetimeFigureOut">
               <a:rPr lang="fr-FR" smtClean="0"/>
-              <a:t>20/12/2017</a:t>
+              <a:t>21/12/2017</a:t>
             </a:fld>
             <a:endParaRPr lang="fr-FR"/>
           </a:p>
@@ -1825,7 +1825,7 @@
           <a:p>
             <a:fld id="{D030C7C0-EEB2-4716-AD63-E01D068BA1F9}" type="datetimeFigureOut">
               <a:rPr lang="fr-FR" smtClean="0"/>
-              <a:t>20/12/2017</a:t>
+              <a:t>21/12/2017</a:t>
             </a:fld>
             <a:endParaRPr lang="fr-FR"/>
           </a:p>
@@ -1966,7 +1966,7 @@
           <a:p>
             <a:fld id="{D030C7C0-EEB2-4716-AD63-E01D068BA1F9}" type="datetimeFigureOut">
               <a:rPr lang="fr-FR" smtClean="0"/>
-              <a:t>20/12/2017</a:t>
+              <a:t>21/12/2017</a:t>
             </a:fld>
             <a:endParaRPr lang="fr-FR"/>
           </a:p>
@@ -2079,7 +2079,7 @@
           <a:p>
             <a:fld id="{D030C7C0-EEB2-4716-AD63-E01D068BA1F9}" type="datetimeFigureOut">
               <a:rPr lang="fr-FR" smtClean="0"/>
-              <a:t>20/12/2017</a:t>
+              <a:t>21/12/2017</a:t>
             </a:fld>
             <a:endParaRPr lang="fr-FR"/>
           </a:p>
@@ -2390,7 +2390,7 @@
           <a:p>
             <a:fld id="{D030C7C0-EEB2-4716-AD63-E01D068BA1F9}" type="datetimeFigureOut">
               <a:rPr lang="fr-FR" smtClean="0"/>
-              <a:t>20/12/2017</a:t>
+              <a:t>21/12/2017</a:t>
             </a:fld>
             <a:endParaRPr lang="fr-FR"/>
           </a:p>
@@ -2678,7 +2678,7 @@
           <a:p>
             <a:fld id="{D030C7C0-EEB2-4716-AD63-E01D068BA1F9}" type="datetimeFigureOut">
               <a:rPr lang="fr-FR" smtClean="0"/>
-              <a:t>20/12/2017</a:t>
+              <a:t>21/12/2017</a:t>
             </a:fld>
             <a:endParaRPr lang="fr-FR"/>
           </a:p>
@@ -2919,7 +2919,7 @@
           <a:p>
             <a:fld id="{D030C7C0-EEB2-4716-AD63-E01D068BA1F9}" type="datetimeFigureOut">
               <a:rPr lang="fr-FR" smtClean="0"/>
-              <a:t>20/12/2017</a:t>
+              <a:t>21/12/2017</a:t>
             </a:fld>
             <a:endParaRPr lang="fr-FR"/>
           </a:p>
@@ -4265,7 +4265,7 @@
           <a:p>
             <a:r>
               <a:rPr lang="fr-FR" dirty="0"/>
-              <a:t>1 D-Link DES-108 (Switch 8 ports)</a:t>
+              <a:t>1 « D-Link DES-108 » (Switch 8 ports)</a:t>
             </a:r>
           </a:p>
           <a:p>
@@ -4402,12 +4402,6 @@
               <a:t>4 Câbles RJ45 catégorie 5e F/UTP 30 m</a:t>
             </a:r>
           </a:p>
-          <a:p>
-            <a:r>
-              <a:rPr lang="fr-FR" dirty="0"/>
-              <a:t>1 Câble HDMI PRO 1.4v 50 m</a:t>
-            </a:r>
-          </a:p>
         </p:txBody>
       </p:sp>
     </p:spTree>
@@ -4492,12 +4486,6 @@
           <a:p>
             <a:r>
               <a:rPr lang="fr-FR" dirty="0"/>
-              <a:t>21 Tables pour les switch LACK Table d'appoint, blanc (146,79 €)</a:t>
-            </a:r>
-          </a:p>
-          <a:p>
-            <a:r>
-              <a:rPr lang="fr-FR" dirty="0"/>
               <a:t>1640m de gaine protège-câble de sécurité 5 cm x 1,2 cm (10414 €)</a:t>
             </a:r>
           </a:p>
@@ -4506,9 +4494,6 @@
               <a:rPr lang="fr-FR" dirty="0"/>
               <a:t>3x(10 x 2,5m) Barrières Vauban (location W-E : 96 €)</a:t>
             </a:r>
-          </a:p>
-          <a:p>
-            <a:endParaRPr lang="fr-FR" dirty="0"/>
           </a:p>
         </p:txBody>
       </p:sp>

</xml_diff>